<commit_message>
Changes to be committed: 	modified:   use_case_diagram.pptx
</commit_message>
<xml_diff>
--- a/doc/pre&docs/use_case_diagram.pptx
+++ b/doc/pre&docs/use_case_diagram.pptx
@@ -104,6 +104,11 @@
       </a:defRPr>
     </a:lvl9pPr>
   </p:defaultTextStyle>
+  <p:extLst>
+    <p:ext uri="{EFAFB233-063F-42B5-8137-9DF3F51BA10A}">
+      <p15:sldGuideLst xmlns:p15="http://schemas.microsoft.com/office/powerpoint/2012/main"/>
+    </p:ext>
+  </p:extLst>
 </p:presentation>
 </file>
 
@@ -238,7 +243,7 @@
           <a:p>
             <a:fld id="{B6DACF57-D58E-4FF2-B9A1-D47D4E56B70D}" type="datetimeFigureOut">
               <a:rPr lang="zh-CN" altLang="en-US" smtClean="0"/>
-              <a:t>2017/11/2</a:t>
+              <a:t>2017/11/8</a:t>
             </a:fld>
             <a:endParaRPr lang="zh-CN" altLang="en-US"/>
           </a:p>
@@ -408,7 +413,7 @@
           <a:p>
             <a:fld id="{B6DACF57-D58E-4FF2-B9A1-D47D4E56B70D}" type="datetimeFigureOut">
               <a:rPr lang="zh-CN" altLang="en-US" smtClean="0"/>
-              <a:t>2017/11/2</a:t>
+              <a:t>2017/11/8</a:t>
             </a:fld>
             <a:endParaRPr lang="zh-CN" altLang="en-US"/>
           </a:p>
@@ -588,7 +593,7 @@
           <a:p>
             <a:fld id="{B6DACF57-D58E-4FF2-B9A1-D47D4E56B70D}" type="datetimeFigureOut">
               <a:rPr lang="zh-CN" altLang="en-US" smtClean="0"/>
-              <a:t>2017/11/2</a:t>
+              <a:t>2017/11/8</a:t>
             </a:fld>
             <a:endParaRPr lang="zh-CN" altLang="en-US"/>
           </a:p>
@@ -758,7 +763,7 @@
           <a:p>
             <a:fld id="{B6DACF57-D58E-4FF2-B9A1-D47D4E56B70D}" type="datetimeFigureOut">
               <a:rPr lang="zh-CN" altLang="en-US" smtClean="0"/>
-              <a:t>2017/11/2</a:t>
+              <a:t>2017/11/8</a:t>
             </a:fld>
             <a:endParaRPr lang="zh-CN" altLang="en-US"/>
           </a:p>
@@ -1004,7 +1009,7 @@
           <a:p>
             <a:fld id="{B6DACF57-D58E-4FF2-B9A1-D47D4E56B70D}" type="datetimeFigureOut">
               <a:rPr lang="zh-CN" altLang="en-US" smtClean="0"/>
-              <a:t>2017/11/2</a:t>
+              <a:t>2017/11/8</a:t>
             </a:fld>
             <a:endParaRPr lang="zh-CN" altLang="en-US"/>
           </a:p>
@@ -1236,7 +1241,7 @@
           <a:p>
             <a:fld id="{B6DACF57-D58E-4FF2-B9A1-D47D4E56B70D}" type="datetimeFigureOut">
               <a:rPr lang="zh-CN" altLang="en-US" smtClean="0"/>
-              <a:t>2017/11/2</a:t>
+              <a:t>2017/11/8</a:t>
             </a:fld>
             <a:endParaRPr lang="zh-CN" altLang="en-US"/>
           </a:p>
@@ -1603,7 +1608,7 @@
           <a:p>
             <a:fld id="{B6DACF57-D58E-4FF2-B9A1-D47D4E56B70D}" type="datetimeFigureOut">
               <a:rPr lang="zh-CN" altLang="en-US" smtClean="0"/>
-              <a:t>2017/11/2</a:t>
+              <a:t>2017/11/8</a:t>
             </a:fld>
             <a:endParaRPr lang="zh-CN" altLang="en-US"/>
           </a:p>
@@ -1721,7 +1726,7 @@
           <a:p>
             <a:fld id="{B6DACF57-D58E-4FF2-B9A1-D47D4E56B70D}" type="datetimeFigureOut">
               <a:rPr lang="zh-CN" altLang="en-US" smtClean="0"/>
-              <a:t>2017/11/2</a:t>
+              <a:t>2017/11/8</a:t>
             </a:fld>
             <a:endParaRPr lang="zh-CN" altLang="en-US"/>
           </a:p>
@@ -1816,7 +1821,7 @@
           <a:p>
             <a:fld id="{B6DACF57-D58E-4FF2-B9A1-D47D4E56B70D}" type="datetimeFigureOut">
               <a:rPr lang="zh-CN" altLang="en-US" smtClean="0"/>
-              <a:t>2017/11/2</a:t>
+              <a:t>2017/11/8</a:t>
             </a:fld>
             <a:endParaRPr lang="zh-CN" altLang="en-US"/>
           </a:p>
@@ -2093,7 +2098,7 @@
           <a:p>
             <a:fld id="{B6DACF57-D58E-4FF2-B9A1-D47D4E56B70D}" type="datetimeFigureOut">
               <a:rPr lang="zh-CN" altLang="en-US" smtClean="0"/>
-              <a:t>2017/11/2</a:t>
+              <a:t>2017/11/8</a:t>
             </a:fld>
             <a:endParaRPr lang="zh-CN" altLang="en-US"/>
           </a:p>
@@ -2346,7 +2351,7 @@
           <a:p>
             <a:fld id="{B6DACF57-D58E-4FF2-B9A1-D47D4E56B70D}" type="datetimeFigureOut">
               <a:rPr lang="zh-CN" altLang="en-US" smtClean="0"/>
-              <a:t>2017/11/2</a:t>
+              <a:t>2017/11/8</a:t>
             </a:fld>
             <a:endParaRPr lang="zh-CN" altLang="en-US"/>
           </a:p>
@@ -2559,7 +2564,7 @@
           <a:p>
             <a:fld id="{B6DACF57-D58E-4FF2-B9A1-D47D4E56B70D}" type="datetimeFigureOut">
               <a:rPr lang="zh-CN" altLang="en-US" smtClean="0"/>
-              <a:t>2017/11/2</a:t>
+              <a:t>2017/11/8</a:t>
             </a:fld>
             <a:endParaRPr lang="zh-CN" altLang="en-US"/>
           </a:p>
@@ -3082,7 +3087,7 @@
         </p:nvSpPr>
         <p:spPr>
           <a:xfrm>
-            <a:off x="2914046" y="1352164"/>
+            <a:off x="2964156" y="1738623"/>
             <a:ext cx="1812472" cy="620486"/>
           </a:xfrm>
           <a:prstGeom prst="ellipse">
@@ -3214,7 +3219,7 @@
         </p:nvSpPr>
         <p:spPr>
           <a:xfrm>
-            <a:off x="2914046" y="2340207"/>
+            <a:off x="2976828" y="2607323"/>
             <a:ext cx="1812472" cy="620486"/>
           </a:xfrm>
           <a:prstGeom prst="ellipse">
@@ -3280,7 +3285,7 @@
         </p:nvSpPr>
         <p:spPr>
           <a:xfrm>
-            <a:off x="2888702" y="4316293"/>
+            <a:off x="2951484" y="4583409"/>
             <a:ext cx="1812472" cy="620486"/>
           </a:xfrm>
           <a:prstGeom prst="ellipse">
@@ -3346,7 +3351,7 @@
         </p:nvSpPr>
         <p:spPr>
           <a:xfrm>
-            <a:off x="2888702" y="3328250"/>
+            <a:off x="2951484" y="3595366"/>
             <a:ext cx="1812472" cy="620486"/>
           </a:xfrm>
           <a:prstGeom prst="ellipse">
@@ -3412,7 +3417,7 @@
         </p:nvSpPr>
         <p:spPr>
           <a:xfrm>
-            <a:off x="8489476" y="2068417"/>
+            <a:off x="8519452" y="2275460"/>
             <a:ext cx="1812472" cy="620486"/>
           </a:xfrm>
           <a:prstGeom prst="ellipse">
@@ -3478,7 +3483,7 @@
         </p:nvSpPr>
         <p:spPr>
           <a:xfrm>
-            <a:off x="2888702" y="5261304"/>
+            <a:off x="2951484" y="5528420"/>
             <a:ext cx="1812472" cy="620486"/>
           </a:xfrm>
           <a:prstGeom prst="ellipse">
@@ -3544,7 +3549,7 @@
         </p:nvSpPr>
         <p:spPr>
           <a:xfrm>
-            <a:off x="8530774" y="4005549"/>
+            <a:off x="8512419" y="3890037"/>
             <a:ext cx="1812472" cy="620486"/>
           </a:xfrm>
           <a:prstGeom prst="ellipse">
@@ -3676,7 +3681,7 @@
         </p:nvSpPr>
         <p:spPr>
           <a:xfrm>
-            <a:off x="8557989" y="4974115"/>
+            <a:off x="8557453" y="4740945"/>
             <a:ext cx="1812472" cy="620486"/>
           </a:xfrm>
           <a:prstGeom prst="ellipse">
@@ -3808,7 +3813,7 @@
         </p:nvSpPr>
         <p:spPr>
           <a:xfrm>
-            <a:off x="5201557" y="29142"/>
+            <a:off x="5431518" y="23825"/>
             <a:ext cx="1812472" cy="620486"/>
           </a:xfrm>
           <a:prstGeom prst="ellipse">
@@ -3932,8 +3937,8 @@
         </p:nvCxnSpPr>
         <p:spPr>
           <a:xfrm flipV="1">
-            <a:off x="1967570" y="1662407"/>
-            <a:ext cx="946476" cy="653575"/>
+            <a:off x="1967570" y="2048866"/>
+            <a:ext cx="996586" cy="267116"/>
           </a:xfrm>
           <a:prstGeom prst="straightConnector1">
             <a:avLst/>
@@ -3967,9 +3972,9 @@
           <p:nvPr/>
         </p:nvCxnSpPr>
         <p:spPr>
-          <a:xfrm>
-            <a:off x="4726518" y="1662407"/>
-            <a:ext cx="970430" cy="291191"/>
+          <a:xfrm flipV="1">
+            <a:off x="4776628" y="1953598"/>
+            <a:ext cx="920320" cy="95268"/>
           </a:xfrm>
           <a:prstGeom prst="straightConnector1">
             <a:avLst/>
@@ -4007,8 +4012,8 @@
         </p:nvCxnSpPr>
         <p:spPr>
           <a:xfrm flipH="1" flipV="1">
-            <a:off x="7014029" y="339385"/>
-            <a:ext cx="4311196" cy="2289726"/>
+            <a:off x="7243990" y="334068"/>
+            <a:ext cx="4081235" cy="2295043"/>
           </a:xfrm>
           <a:prstGeom prst="straightConnector1">
             <a:avLst/>
@@ -4042,8 +4047,8 @@
         </p:nvCxnSpPr>
         <p:spPr>
           <a:xfrm flipV="1">
-            <a:off x="1815170" y="339385"/>
-            <a:ext cx="3386387" cy="1593774"/>
+            <a:off x="1825346" y="334068"/>
+            <a:ext cx="3606172" cy="1582072"/>
           </a:xfrm>
           <a:prstGeom prst="straightConnector1">
             <a:avLst/>
@@ -4145,7 +4150,7 @@
         <p:spPr>
           <a:xfrm>
             <a:off x="1967570" y="2315982"/>
-            <a:ext cx="946476" cy="334468"/>
+            <a:ext cx="1009258" cy="601584"/>
           </a:xfrm>
           <a:prstGeom prst="straightConnector1">
             <a:avLst/>
@@ -4181,7 +4186,7 @@
         <p:spPr>
           <a:xfrm>
             <a:off x="1967570" y="2315982"/>
-            <a:ext cx="921132" cy="1322511"/>
+            <a:ext cx="983914" cy="1589627"/>
           </a:xfrm>
           <a:prstGeom prst="straightConnector1">
             <a:avLst/>
@@ -4217,7 +4222,7 @@
         <p:spPr>
           <a:xfrm>
             <a:off x="1967570" y="2315982"/>
-            <a:ext cx="921132" cy="2310554"/>
+            <a:ext cx="983914" cy="2577670"/>
           </a:xfrm>
           <a:prstGeom prst="straightConnector1">
             <a:avLst/>
@@ -4253,7 +4258,7 @@
         <p:spPr>
           <a:xfrm>
             <a:off x="1967570" y="2315982"/>
-            <a:ext cx="921132" cy="3255565"/>
+            <a:ext cx="983914" cy="3522681"/>
           </a:xfrm>
           <a:prstGeom prst="straightConnector1">
             <a:avLst/>
@@ -4288,8 +4293,8 @@
         </p:nvCxnSpPr>
         <p:spPr>
           <a:xfrm flipV="1">
-            <a:off x="1962557" y="3638493"/>
-            <a:ext cx="926145" cy="799685"/>
+            <a:off x="1962557" y="3905609"/>
+            <a:ext cx="988927" cy="532569"/>
           </a:xfrm>
           <a:prstGeom prst="straightConnector1">
             <a:avLst/>
@@ -4325,7 +4330,7 @@
         <p:spPr>
           <a:xfrm>
             <a:off x="1962557" y="4438178"/>
-            <a:ext cx="926145" cy="1133369"/>
+            <a:ext cx="988927" cy="1400485"/>
           </a:xfrm>
           <a:prstGeom prst="straightConnector1">
             <a:avLst/>
@@ -4425,14 +4430,13 @@
         <p:nvCxnSpPr>
           <p:cNvPr id="75" name="直接箭头连接符 74"/>
           <p:cNvCxnSpPr>
-            <a:stCxn id="20" idx="2"/>
             <a:endCxn id="12" idx="6"/>
           </p:cNvCxnSpPr>
           <p:nvPr/>
         </p:nvCxnSpPr>
         <p:spPr>
           <a:xfrm flipH="1" flipV="1">
-            <a:off x="4726518" y="2650450"/>
+            <a:off x="4789300" y="2917566"/>
             <a:ext cx="705000" cy="1387885"/>
           </a:xfrm>
           <a:prstGeom prst="straightConnector1">
@@ -4461,14 +4465,13 @@
         <p:nvCxnSpPr>
           <p:cNvPr id="77" name="直接箭头连接符 76"/>
           <p:cNvCxnSpPr>
-            <a:stCxn id="20" idx="2"/>
             <a:endCxn id="14" idx="6"/>
           </p:cNvCxnSpPr>
           <p:nvPr/>
         </p:nvCxnSpPr>
         <p:spPr>
           <a:xfrm flipH="1" flipV="1">
-            <a:off x="4701174" y="3638493"/>
+            <a:off x="4763956" y="3905609"/>
             <a:ext cx="730344" cy="399842"/>
           </a:xfrm>
           <a:prstGeom prst="straightConnector1">
@@ -4497,14 +4500,13 @@
         <p:nvCxnSpPr>
           <p:cNvPr id="79" name="直接箭头连接符 78"/>
           <p:cNvCxnSpPr>
-            <a:stCxn id="20" idx="2"/>
             <a:endCxn id="13" idx="6"/>
           </p:cNvCxnSpPr>
           <p:nvPr/>
         </p:nvCxnSpPr>
         <p:spPr>
           <a:xfrm flipH="1">
-            <a:off x="4701174" y="4038335"/>
+            <a:off x="4763956" y="4305451"/>
             <a:ext cx="730344" cy="588201"/>
           </a:xfrm>
           <a:prstGeom prst="straightConnector1">
@@ -4533,14 +4535,13 @@
         <p:nvCxnSpPr>
           <p:cNvPr id="81" name="直接箭头连接符 80"/>
           <p:cNvCxnSpPr>
-            <a:stCxn id="20" idx="2"/>
             <a:endCxn id="16" idx="6"/>
           </p:cNvCxnSpPr>
           <p:nvPr/>
         </p:nvCxnSpPr>
         <p:spPr>
           <a:xfrm flipH="1">
-            <a:off x="4701174" y="4038335"/>
+            <a:off x="4763956" y="4305451"/>
             <a:ext cx="730344" cy="1533212"/>
           </a:xfrm>
           <a:prstGeom prst="straightConnector1">
@@ -4612,8 +4613,8 @@
         </p:nvCxnSpPr>
         <p:spPr>
           <a:xfrm flipH="1" flipV="1">
-            <a:off x="10301948" y="2378660"/>
-            <a:ext cx="347002" cy="898151"/>
+            <a:off x="10331924" y="2585703"/>
+            <a:ext cx="317026" cy="691108"/>
           </a:xfrm>
           <a:prstGeom prst="straightConnector1">
             <a:avLst/>
@@ -4684,8 +4685,8 @@
         </p:nvCxnSpPr>
         <p:spPr>
           <a:xfrm flipH="1">
-            <a:off x="10343246" y="3276811"/>
-            <a:ext cx="305704" cy="1038981"/>
+            <a:off x="10324891" y="3276811"/>
+            <a:ext cx="324059" cy="923469"/>
           </a:xfrm>
           <a:prstGeom prst="straightConnector1">
             <a:avLst/>
@@ -4720,8 +4721,8 @@
         </p:nvCxnSpPr>
         <p:spPr>
           <a:xfrm flipH="1">
-            <a:off x="10370461" y="3276811"/>
-            <a:ext cx="278489" cy="2007547"/>
+            <a:off x="10369925" y="3276811"/>
+            <a:ext cx="279025" cy="1774377"/>
           </a:xfrm>
           <a:prstGeom prst="straightConnector1">
             <a:avLst/>
@@ -4756,8 +4757,8 @@
         </p:nvCxnSpPr>
         <p:spPr>
           <a:xfrm flipH="1">
-            <a:off x="7243990" y="2378660"/>
-            <a:ext cx="1245486" cy="1659675"/>
+            <a:off x="7243990" y="2585703"/>
+            <a:ext cx="1275462" cy="1452632"/>
           </a:xfrm>
           <a:prstGeom prst="straightConnector1">
             <a:avLst/>
@@ -4864,7 +4865,144 @@
         <p:spPr>
           <a:xfrm flipH="1" flipV="1">
             <a:off x="7243990" y="4038335"/>
-            <a:ext cx="1313999" cy="1246023"/>
+            <a:ext cx="1313463" cy="1012853"/>
+          </a:xfrm>
+          <a:prstGeom prst="straightConnector1">
+            <a:avLst/>
+          </a:prstGeom>
+          <a:ln>
+            <a:tailEnd type="triangle"/>
+          </a:ln>
+        </p:spPr>
+        <p:style>
+          <a:lnRef idx="1">
+            <a:schemeClr val="accent1"/>
+          </a:lnRef>
+          <a:fillRef idx="0">
+            <a:schemeClr val="accent1"/>
+          </a:fillRef>
+          <a:effectRef idx="0">
+            <a:schemeClr val="accent1"/>
+          </a:effectRef>
+          <a:fontRef idx="minor">
+            <a:schemeClr val="tx1"/>
+          </a:fontRef>
+        </p:style>
+      </p:cxnSp>
+      <p:sp>
+        <p:nvSpPr>
+          <p:cNvPr id="60" name="椭圆 59"/>
+          <p:cNvSpPr/>
+          <p:nvPr/>
+        </p:nvSpPr>
+        <p:spPr>
+          <a:xfrm>
+            <a:off x="5431518" y="710674"/>
+            <a:ext cx="1812472" cy="620486"/>
+          </a:xfrm>
+          <a:prstGeom prst="ellipse">
+            <a:avLst/>
+          </a:prstGeom>
+        </p:spPr>
+        <p:style>
+          <a:lnRef idx="2">
+            <a:schemeClr val="accent1"/>
+          </a:lnRef>
+          <a:fillRef idx="1">
+            <a:schemeClr val="lt1"/>
+          </a:fillRef>
+          <a:effectRef idx="0">
+            <a:schemeClr val="accent1"/>
+          </a:effectRef>
+          <a:fontRef idx="minor">
+            <a:schemeClr val="dk1"/>
+          </a:fontRef>
+        </p:style>
+        <p:txBody>
+          <a:bodyPr rtlCol="0" anchor="ctr"/>
+          <a:lstStyle/>
+          <a:p>
+            <a:pPr algn="ctr"/>
+            <a:r>
+              <a:rPr lang="zh-CN" altLang="en-US" dirty="0" smtClean="0">
+                <a:ln w="0"/>
+                <a:solidFill>
+                  <a:schemeClr val="tx1"/>
+                </a:solidFill>
+                <a:effectLst>
+                  <a:outerShdw blurRad="38100" dist="19050" dir="2700000" algn="tl" rotWithShape="0">
+                    <a:schemeClr val="dk1">
+                      <a:alpha val="40000"/>
+                    </a:schemeClr>
+                  </a:outerShdw>
+                </a:effectLst>
+              </a:rPr>
+              <a:t>登录</a:t>
+            </a:r>
+            <a:endParaRPr lang="zh-CN" altLang="en-US" dirty="0">
+              <a:ln w="0"/>
+              <a:solidFill>
+                <a:schemeClr val="tx1"/>
+              </a:solidFill>
+              <a:effectLst>
+                <a:outerShdw blurRad="38100" dist="19050" dir="2700000" algn="tl" rotWithShape="0">
+                  <a:schemeClr val="dk1">
+                    <a:alpha val="40000"/>
+                  </a:schemeClr>
+                </a:outerShdw>
+              </a:effectLst>
+            </a:endParaRPr>
+          </a:p>
+        </p:txBody>
+      </p:sp>
+      <p:cxnSp>
+        <p:nvCxnSpPr>
+          <p:cNvPr id="38" name="直接箭头连接符 37"/>
+          <p:cNvCxnSpPr>
+            <a:endCxn id="60" idx="2"/>
+          </p:cNvCxnSpPr>
+          <p:nvPr/>
+        </p:nvCxnSpPr>
+        <p:spPr>
+          <a:xfrm flipV="1">
+            <a:off x="1825346" y="1020917"/>
+            <a:ext cx="3606172" cy="895223"/>
+          </a:xfrm>
+          <a:prstGeom prst="straightConnector1">
+            <a:avLst/>
+          </a:prstGeom>
+          <a:ln>
+            <a:tailEnd type="triangle"/>
+          </a:ln>
+        </p:spPr>
+        <p:style>
+          <a:lnRef idx="1">
+            <a:schemeClr val="accent1"/>
+          </a:lnRef>
+          <a:fillRef idx="0">
+            <a:schemeClr val="accent1"/>
+          </a:fillRef>
+          <a:effectRef idx="0">
+            <a:schemeClr val="accent1"/>
+          </a:effectRef>
+          <a:fontRef idx="minor">
+            <a:schemeClr val="tx1"/>
+          </a:fontRef>
+        </p:style>
+      </p:cxnSp>
+      <p:cxnSp>
+        <p:nvCxnSpPr>
+          <p:cNvPr id="42" name="直接箭头连接符 41"/>
+          <p:cNvCxnSpPr>
+            <a:stCxn id="6" idx="0"/>
+            <a:endCxn id="60" idx="6"/>
+          </p:cNvCxnSpPr>
+          <p:nvPr/>
+        </p:nvCxnSpPr>
+        <p:spPr>
+          <a:xfrm flipH="1" flipV="1">
+            <a:off x="7243990" y="1020917"/>
+            <a:ext cx="4081235" cy="1608194"/>
           </a:xfrm>
           <a:prstGeom prst="straightConnector1">
             <a:avLst/>

</xml_diff>